<commit_message>
Update yarn.lock and pptx
</commit_message>
<xml_diff>
--- a/RemoteBlazor.pptx
+++ b/RemoteBlazor.pptx
@@ -168,7 +168,7 @@
           <a:noFill/>
           <a:extLst>
             <a:ext uri="{909E8E84-426E-40dd-AFC4-6F175D3DCCD1}">
-              <a14:hiddenFill xmlns="" xmlns:a14="http://schemas.microsoft.com/office/drawing/2010/main">
+              <a14:hiddenFill xmlns:a14="http://schemas.microsoft.com/office/drawing/2010/main" xmlns="">
                 <a:solidFill>
                   <a:srgbClr val="FFFFFF"/>
                 </a:solidFill>
@@ -228,7 +228,7 @@
             </a:ln>
             <a:extLst>
               <a:ext uri="{91240B29-F687-4f45-9708-019B960494DF}">
-                <a14:hiddenLine xmlns="" xmlns:a14="http://schemas.microsoft.com/office/drawing/2010/main" w="9525">
+                <a14:hiddenLine xmlns:a14="http://schemas.microsoft.com/office/drawing/2010/main" xmlns="" w="9525">
                   <a:solidFill>
                     <a:srgbClr val="000000"/>
                   </a:solidFill>
@@ -318,7 +318,7 @@
             </a:ln>
             <a:extLst>
               <a:ext uri="{91240B29-F687-4f45-9708-019B960494DF}">
-                <a14:hiddenLine xmlns="" xmlns:a14="http://schemas.microsoft.com/office/drawing/2010/main" w="9525">
+                <a14:hiddenLine xmlns:a14="http://schemas.microsoft.com/office/drawing/2010/main" xmlns="" w="9525">
                   <a:solidFill>
                     <a:srgbClr val="000000"/>
                   </a:solidFill>
@@ -408,7 +408,7 @@
             </a:ln>
             <a:extLst>
               <a:ext uri="{91240B29-F687-4f45-9708-019B960494DF}">
-                <a14:hiddenLine xmlns="" xmlns:a14="http://schemas.microsoft.com/office/drawing/2010/main" w="9525">
+                <a14:hiddenLine xmlns:a14="http://schemas.microsoft.com/office/drawing/2010/main" xmlns="" w="9525">
                   <a:solidFill>
                     <a:srgbClr val="000000"/>
                   </a:solidFill>
@@ -442,7 +442,7 @@
             </a:ln>
             <a:extLst>
               <a:ext uri="{91240B29-F687-4f45-9708-019B960494DF}">
-                <a14:hiddenLine xmlns="" xmlns:a14="http://schemas.microsoft.com/office/drawing/2010/main" w="9525">
+                <a14:hiddenLine xmlns:a14="http://schemas.microsoft.com/office/drawing/2010/main" xmlns="" w="9525">
                   <a:solidFill>
                     <a:srgbClr val="000000"/>
                   </a:solidFill>
@@ -532,7 +532,7 @@
             </a:ln>
             <a:extLst>
               <a:ext uri="{91240B29-F687-4f45-9708-019B960494DF}">
-                <a14:hiddenLine xmlns="" xmlns:a14="http://schemas.microsoft.com/office/drawing/2010/main" w="9525">
+                <a14:hiddenLine xmlns:a14="http://schemas.microsoft.com/office/drawing/2010/main" xmlns="" w="9525">
                   <a:solidFill>
                     <a:srgbClr val="000000"/>
                   </a:solidFill>
@@ -594,7 +594,7 @@
             </a:ln>
             <a:extLst>
               <a:ext uri="{91240B29-F687-4f45-9708-019B960494DF}">
-                <a14:hiddenLine xmlns="" xmlns:a14="http://schemas.microsoft.com/office/drawing/2010/main" w="9525">
+                <a14:hiddenLine xmlns:a14="http://schemas.microsoft.com/office/drawing/2010/main" xmlns="" w="9525">
                   <a:solidFill>
                     <a:srgbClr val="000000"/>
                   </a:solidFill>
@@ -656,7 +656,7 @@
             </a:ln>
             <a:extLst>
               <a:ext uri="{91240B29-F687-4f45-9708-019B960494DF}">
-                <a14:hiddenLine xmlns="" xmlns:a14="http://schemas.microsoft.com/office/drawing/2010/main" w="9525">
+                <a14:hiddenLine xmlns:a14="http://schemas.microsoft.com/office/drawing/2010/main" xmlns="" w="9525">
                   <a:solidFill>
                     <a:srgbClr val="000000"/>
                   </a:solidFill>
@@ -746,7 +746,7 @@
             </a:ln>
             <a:extLst>
               <a:ext uri="{91240B29-F687-4f45-9708-019B960494DF}">
-                <a14:hiddenLine xmlns="" xmlns:a14="http://schemas.microsoft.com/office/drawing/2010/main" w="9525">
+                <a14:hiddenLine xmlns:a14="http://schemas.microsoft.com/office/drawing/2010/main" xmlns="" w="9525">
                   <a:solidFill>
                     <a:srgbClr val="000000"/>
                   </a:solidFill>
@@ -808,7 +808,7 @@
             </a:ln>
             <a:extLst>
               <a:ext uri="{91240B29-F687-4f45-9708-019B960494DF}">
-                <a14:hiddenLine xmlns="" xmlns:a14="http://schemas.microsoft.com/office/drawing/2010/main" w="9525">
+                <a14:hiddenLine xmlns:a14="http://schemas.microsoft.com/office/drawing/2010/main" xmlns="" w="9525">
                   <a:solidFill>
                     <a:srgbClr val="000000"/>
                   </a:solidFill>
@@ -870,7 +870,7 @@
             </a:ln>
             <a:extLst>
               <a:ext uri="{91240B29-F687-4f45-9708-019B960494DF}">
-                <a14:hiddenLine xmlns="" xmlns:a14="http://schemas.microsoft.com/office/drawing/2010/main" w="9525">
+                <a14:hiddenLine xmlns:a14="http://schemas.microsoft.com/office/drawing/2010/main" xmlns="" w="9525">
                   <a:solidFill>
                     <a:srgbClr val="000000"/>
                   </a:solidFill>
@@ -960,7 +960,7 @@
             </a:ln>
             <a:extLst>
               <a:ext uri="{91240B29-F687-4f45-9708-019B960494DF}">
-                <a14:hiddenLine xmlns="" xmlns:a14="http://schemas.microsoft.com/office/drawing/2010/main" w="9525">
+                <a14:hiddenLine xmlns:a14="http://schemas.microsoft.com/office/drawing/2010/main" xmlns="" w="9525">
                   <a:solidFill>
                     <a:srgbClr val="000000"/>
                   </a:solidFill>
@@ -1050,7 +1050,7 @@
             </a:ln>
             <a:extLst>
               <a:ext uri="{91240B29-F687-4f45-9708-019B960494DF}">
-                <a14:hiddenLine xmlns="" xmlns:a14="http://schemas.microsoft.com/office/drawing/2010/main" w="9525">
+                <a14:hiddenLine xmlns:a14="http://schemas.microsoft.com/office/drawing/2010/main" xmlns="" w="9525">
                   <a:solidFill>
                     <a:srgbClr val="000000"/>
                   </a:solidFill>
@@ -1112,7 +1112,7 @@
             </a:ln>
             <a:extLst>
               <a:ext uri="{91240B29-F687-4f45-9708-019B960494DF}">
-                <a14:hiddenLine xmlns="" xmlns:a14="http://schemas.microsoft.com/office/drawing/2010/main" w="9525">
+                <a14:hiddenLine xmlns:a14="http://schemas.microsoft.com/office/drawing/2010/main" xmlns="" w="9525">
                   <a:solidFill>
                     <a:srgbClr val="000000"/>
                   </a:solidFill>
@@ -1222,7 +1222,7 @@
             </a:ln>
             <a:extLst>
               <a:ext uri="{91240B29-F687-4f45-9708-019B960494DF}">
-                <a14:hiddenLine xmlns="" xmlns:a14="http://schemas.microsoft.com/office/drawing/2010/main" w="9525">
+                <a14:hiddenLine xmlns:a14="http://schemas.microsoft.com/office/drawing/2010/main" xmlns="" w="9525">
                   <a:solidFill>
                     <a:srgbClr val="000000"/>
                   </a:solidFill>
@@ -1284,7 +1284,7 @@
             </a:ln>
             <a:extLst>
               <a:ext uri="{91240B29-F687-4f45-9708-019B960494DF}">
-                <a14:hiddenLine xmlns="" xmlns:a14="http://schemas.microsoft.com/office/drawing/2010/main" w="9525">
+                <a14:hiddenLine xmlns:a14="http://schemas.microsoft.com/office/drawing/2010/main" xmlns="" w="9525">
                   <a:solidFill>
                     <a:srgbClr val="000000"/>
                   </a:solidFill>
@@ -1374,7 +1374,7 @@
             </a:ln>
             <a:extLst>
               <a:ext uri="{91240B29-F687-4f45-9708-019B960494DF}">
-                <a14:hiddenLine xmlns="" xmlns:a14="http://schemas.microsoft.com/office/drawing/2010/main" w="9525">
+                <a14:hiddenLine xmlns:a14="http://schemas.microsoft.com/office/drawing/2010/main" xmlns="" w="9525">
                   <a:solidFill>
                     <a:srgbClr val="000000"/>
                   </a:solidFill>
@@ -1464,7 +1464,7 @@
             </a:ln>
             <a:extLst>
               <a:ext uri="{91240B29-F687-4f45-9708-019B960494DF}">
-                <a14:hiddenLine xmlns="" xmlns:a14="http://schemas.microsoft.com/office/drawing/2010/main" w="9525">
+                <a14:hiddenLine xmlns:a14="http://schemas.microsoft.com/office/drawing/2010/main" xmlns="" w="9525">
                   <a:solidFill>
                     <a:srgbClr val="000000"/>
                   </a:solidFill>
@@ -1526,7 +1526,7 @@
             </a:ln>
             <a:extLst>
               <a:ext uri="{91240B29-F687-4f45-9708-019B960494DF}">
-                <a14:hiddenLine xmlns="" xmlns:a14="http://schemas.microsoft.com/office/drawing/2010/main" w="9525">
+                <a14:hiddenLine xmlns:a14="http://schemas.microsoft.com/office/drawing/2010/main" xmlns="" w="9525">
                   <a:solidFill>
                     <a:srgbClr val="000000"/>
                   </a:solidFill>
@@ -1616,7 +1616,7 @@
             </a:ln>
             <a:extLst>
               <a:ext uri="{91240B29-F687-4f45-9708-019B960494DF}">
-                <a14:hiddenLine xmlns="" xmlns:a14="http://schemas.microsoft.com/office/drawing/2010/main" w="9525">
+                <a14:hiddenLine xmlns:a14="http://schemas.microsoft.com/office/drawing/2010/main" xmlns="" w="9525">
                   <a:solidFill>
                     <a:srgbClr val="000000"/>
                   </a:solidFill>
@@ -1706,7 +1706,7 @@
             </a:ln>
             <a:extLst>
               <a:ext uri="{91240B29-F687-4f45-9708-019B960494DF}">
-                <a14:hiddenLine xmlns="" xmlns:a14="http://schemas.microsoft.com/office/drawing/2010/main" w="9525">
+                <a14:hiddenLine xmlns:a14="http://schemas.microsoft.com/office/drawing/2010/main" xmlns="" w="9525">
                   <a:solidFill>
                     <a:srgbClr val="000000"/>
                   </a:solidFill>
@@ -1762,7 +1762,7 @@
             </a:ln>
             <a:extLst>
               <a:ext uri="{91240B29-F687-4f45-9708-019B960494DF}">
-                <a14:hiddenLine xmlns="" xmlns:a14="http://schemas.microsoft.com/office/drawing/2010/main" w="9525">
+                <a14:hiddenLine xmlns:a14="http://schemas.microsoft.com/office/drawing/2010/main" xmlns="" w="9525">
                   <a:solidFill>
                     <a:srgbClr val="000000"/>
                   </a:solidFill>
@@ -1852,7 +1852,7 @@
             </a:ln>
             <a:extLst>
               <a:ext uri="{91240B29-F687-4f45-9708-019B960494DF}">
-                <a14:hiddenLine xmlns="" xmlns:a14="http://schemas.microsoft.com/office/drawing/2010/main" w="9525">
+                <a14:hiddenLine xmlns:a14="http://schemas.microsoft.com/office/drawing/2010/main" xmlns="" w="9525">
                   <a:solidFill>
                     <a:srgbClr val="000000"/>
                   </a:solidFill>
@@ -1908,7 +1908,7 @@
             </a:ln>
             <a:extLst>
               <a:ext uri="{91240B29-F687-4f45-9708-019B960494DF}">
-                <a14:hiddenLine xmlns="" xmlns:a14="http://schemas.microsoft.com/office/drawing/2010/main" w="9525">
+                <a14:hiddenLine xmlns:a14="http://schemas.microsoft.com/office/drawing/2010/main" xmlns="" w="9525">
                   <a:solidFill>
                     <a:srgbClr val="000000"/>
                   </a:solidFill>
@@ -1998,7 +1998,7 @@
             </a:ln>
             <a:extLst>
               <a:ext uri="{91240B29-F687-4f45-9708-019B960494DF}">
-                <a14:hiddenLine xmlns="" xmlns:a14="http://schemas.microsoft.com/office/drawing/2010/main" w="9525">
+                <a14:hiddenLine xmlns:a14="http://schemas.microsoft.com/office/drawing/2010/main" xmlns="" w="9525">
                   <a:solidFill>
                     <a:srgbClr val="000000"/>
                   </a:solidFill>
@@ -2066,7 +2066,7 @@
             </a:ln>
             <a:extLst>
               <a:ext uri="{91240B29-F687-4f45-9708-019B960494DF}">
-                <a14:hiddenLine xmlns="" xmlns:a14="http://schemas.microsoft.com/office/drawing/2010/main" w="9525">
+                <a14:hiddenLine xmlns:a14="http://schemas.microsoft.com/office/drawing/2010/main" xmlns="" w="9525">
                   <a:solidFill>
                     <a:srgbClr val="000000"/>
                   </a:solidFill>
@@ -2156,7 +2156,7 @@
             </a:ln>
             <a:extLst>
               <a:ext uri="{91240B29-F687-4f45-9708-019B960494DF}">
-                <a14:hiddenLine xmlns="" xmlns:a14="http://schemas.microsoft.com/office/drawing/2010/main" w="9525">
+                <a14:hiddenLine xmlns:a14="http://schemas.microsoft.com/office/drawing/2010/main" xmlns="" w="9525">
                   <a:solidFill>
                     <a:srgbClr val="000000"/>
                   </a:solidFill>
@@ -2224,7 +2224,7 @@
             </a:ln>
             <a:extLst>
               <a:ext uri="{91240B29-F687-4f45-9708-019B960494DF}">
-                <a14:hiddenLine xmlns="" xmlns:a14="http://schemas.microsoft.com/office/drawing/2010/main" w="9525">
+                <a14:hiddenLine xmlns:a14="http://schemas.microsoft.com/office/drawing/2010/main" xmlns="" w="9525">
                   <a:solidFill>
                     <a:srgbClr val="000000"/>
                   </a:solidFill>
@@ -2314,7 +2314,7 @@
             </a:ln>
             <a:extLst>
               <a:ext uri="{91240B29-F687-4f45-9708-019B960494DF}">
-                <a14:hiddenLine xmlns="" xmlns:a14="http://schemas.microsoft.com/office/drawing/2010/main" w="9525">
+                <a14:hiddenLine xmlns:a14="http://schemas.microsoft.com/office/drawing/2010/main" xmlns="" w="9525">
                   <a:solidFill>
                     <a:srgbClr val="000000"/>
                   </a:solidFill>
@@ -2348,7 +2348,7 @@
             </a:ln>
             <a:extLst>
               <a:ext uri="{91240B29-F687-4f45-9708-019B960494DF}">
-                <a14:hiddenLine xmlns="" xmlns:a14="http://schemas.microsoft.com/office/drawing/2010/main" w="9525">
+                <a14:hiddenLine xmlns:a14="http://schemas.microsoft.com/office/drawing/2010/main" xmlns="" w="9525">
                   <a:solidFill>
                     <a:srgbClr val="000000"/>
                   </a:solidFill>
@@ -2438,7 +2438,7 @@
             </a:ln>
             <a:extLst>
               <a:ext uri="{91240B29-F687-4f45-9708-019B960494DF}">
-                <a14:hiddenLine xmlns="" xmlns:a14="http://schemas.microsoft.com/office/drawing/2010/main" w="9525">
+                <a14:hiddenLine xmlns:a14="http://schemas.microsoft.com/office/drawing/2010/main" xmlns="" w="9525">
                   <a:solidFill>
                     <a:srgbClr val="000000"/>
                   </a:solidFill>
@@ -2500,7 +2500,7 @@
             </a:ln>
             <a:extLst>
               <a:ext uri="{91240B29-F687-4f45-9708-019B960494DF}">
-                <a14:hiddenLine xmlns="" xmlns:a14="http://schemas.microsoft.com/office/drawing/2010/main" w="9525">
+                <a14:hiddenLine xmlns:a14="http://schemas.microsoft.com/office/drawing/2010/main" xmlns="" w="9525">
                   <a:solidFill>
                     <a:srgbClr val="000000"/>
                   </a:solidFill>
@@ -2562,7 +2562,7 @@
             </a:ln>
             <a:extLst>
               <a:ext uri="{91240B29-F687-4f45-9708-019B960494DF}">
-                <a14:hiddenLine xmlns="" xmlns:a14="http://schemas.microsoft.com/office/drawing/2010/main" w="9525">
+                <a14:hiddenLine xmlns:a14="http://schemas.microsoft.com/office/drawing/2010/main" xmlns="" w="9525">
                   <a:solidFill>
                     <a:srgbClr val="000000"/>
                   </a:solidFill>
@@ -2652,7 +2652,7 @@
             </a:ln>
             <a:extLst>
               <a:ext uri="{91240B29-F687-4f45-9708-019B960494DF}">
-                <a14:hiddenLine xmlns="" xmlns:a14="http://schemas.microsoft.com/office/drawing/2010/main" w="9525">
+                <a14:hiddenLine xmlns:a14="http://schemas.microsoft.com/office/drawing/2010/main" xmlns="" w="9525">
                   <a:solidFill>
                     <a:srgbClr val="000000"/>
                   </a:solidFill>
@@ -2720,7 +2720,7 @@
             </a:ln>
             <a:extLst>
               <a:ext uri="{91240B29-F687-4f45-9708-019B960494DF}">
-                <a14:hiddenLine xmlns="" xmlns:a14="http://schemas.microsoft.com/office/drawing/2010/main" w="9525">
+                <a14:hiddenLine xmlns:a14="http://schemas.microsoft.com/office/drawing/2010/main" xmlns="" w="9525">
                   <a:solidFill>
                     <a:srgbClr val="000000"/>
                   </a:solidFill>
@@ -2782,7 +2782,7 @@
             </a:ln>
             <a:extLst>
               <a:ext uri="{91240B29-F687-4f45-9708-019B960494DF}">
-                <a14:hiddenLine xmlns="" xmlns:a14="http://schemas.microsoft.com/office/drawing/2010/main" w="9525">
+                <a14:hiddenLine xmlns:a14="http://schemas.microsoft.com/office/drawing/2010/main" xmlns="" w="9525">
                   <a:solidFill>
                     <a:srgbClr val="000000"/>
                   </a:solidFill>
@@ -2872,7 +2872,7 @@
             </a:ln>
             <a:extLst>
               <a:ext uri="{91240B29-F687-4f45-9708-019B960494DF}">
-                <a14:hiddenLine xmlns="" xmlns:a14="http://schemas.microsoft.com/office/drawing/2010/main" w="9525">
+                <a14:hiddenLine xmlns:a14="http://schemas.microsoft.com/office/drawing/2010/main" xmlns="" w="9525">
                   <a:solidFill>
                     <a:srgbClr val="000000"/>
                   </a:solidFill>
@@ -2934,7 +2934,7 @@
             </a:ln>
             <a:extLst>
               <a:ext uri="{91240B29-F687-4f45-9708-019B960494DF}">
-                <a14:hiddenLine xmlns="" xmlns:a14="http://schemas.microsoft.com/office/drawing/2010/main" w="9525">
+                <a14:hiddenLine xmlns:a14="http://schemas.microsoft.com/office/drawing/2010/main" xmlns="" w="9525">
                   <a:solidFill>
                     <a:srgbClr val="000000"/>
                   </a:solidFill>
@@ -3024,7 +3024,7 @@
             </a:ln>
             <a:extLst>
               <a:ext uri="{91240B29-F687-4f45-9708-019B960494DF}">
-                <a14:hiddenLine xmlns="" xmlns:a14="http://schemas.microsoft.com/office/drawing/2010/main" w="9525">
+                <a14:hiddenLine xmlns:a14="http://schemas.microsoft.com/office/drawing/2010/main" xmlns="" w="9525">
                   <a:solidFill>
                     <a:srgbClr val="000000"/>
                   </a:solidFill>
@@ -3086,7 +3086,7 @@
             </a:ln>
             <a:extLst>
               <a:ext uri="{91240B29-F687-4f45-9708-019B960494DF}">
-                <a14:hiddenLine xmlns="" xmlns:a14="http://schemas.microsoft.com/office/drawing/2010/main" w="9525">
+                <a14:hiddenLine xmlns:a14="http://schemas.microsoft.com/office/drawing/2010/main" xmlns="" w="9525">
                   <a:solidFill>
                     <a:srgbClr val="000000"/>
                   </a:solidFill>
@@ -3176,7 +3176,7 @@
             </a:ln>
             <a:extLst>
               <a:ext uri="{91240B29-F687-4f45-9708-019B960494DF}">
-                <a14:hiddenLine xmlns="" xmlns:a14="http://schemas.microsoft.com/office/drawing/2010/main" w="9525">
+                <a14:hiddenLine xmlns:a14="http://schemas.microsoft.com/office/drawing/2010/main" xmlns="" w="9525">
                   <a:solidFill>
                     <a:srgbClr val="000000"/>
                   </a:solidFill>
@@ -3210,7 +3210,7 @@
             </a:ln>
             <a:extLst>
               <a:ext uri="{91240B29-F687-4f45-9708-019B960494DF}">
-                <a14:hiddenLine xmlns="" xmlns:a14="http://schemas.microsoft.com/office/drawing/2010/main" w="9525">
+                <a14:hiddenLine xmlns:a14="http://schemas.microsoft.com/office/drawing/2010/main" xmlns="" w="9525">
                   <a:solidFill>
                     <a:srgbClr val="000000"/>
                   </a:solidFill>
@@ -3275,7 +3275,7 @@
             </a:ln>
             <a:extLst>
               <a:ext uri="{91240B29-F687-4f45-9708-019B960494DF}">
-                <a14:hiddenLine xmlns="" xmlns:a14="http://schemas.microsoft.com/office/drawing/2010/main" w="9525">
+                <a14:hiddenLine xmlns:a14="http://schemas.microsoft.com/office/drawing/2010/main" xmlns="" w="9525">
                   <a:solidFill>
                     <a:srgbClr val="000000"/>
                   </a:solidFill>
@@ -3365,7 +3365,7 @@
             </a:ln>
             <a:extLst>
               <a:ext uri="{91240B29-F687-4f45-9708-019B960494DF}">
-                <a14:hiddenLine xmlns="" xmlns:a14="http://schemas.microsoft.com/office/drawing/2010/main" w="9525">
+                <a14:hiddenLine xmlns:a14="http://schemas.microsoft.com/office/drawing/2010/main" xmlns="" w="9525">
                   <a:solidFill>
                     <a:srgbClr val="000000"/>
                   </a:solidFill>
@@ -3427,7 +3427,7 @@
             </a:ln>
             <a:extLst>
               <a:ext uri="{91240B29-F687-4f45-9708-019B960494DF}">
-                <a14:hiddenLine xmlns="" xmlns:a14="http://schemas.microsoft.com/office/drawing/2010/main" w="9525">
+                <a14:hiddenLine xmlns:a14="http://schemas.microsoft.com/office/drawing/2010/main" xmlns="" w="9525">
                   <a:solidFill>
                     <a:srgbClr val="000000"/>
                   </a:solidFill>
@@ -3517,7 +3517,7 @@
             </a:ln>
             <a:extLst>
               <a:ext uri="{91240B29-F687-4f45-9708-019B960494DF}">
-                <a14:hiddenLine xmlns="" xmlns:a14="http://schemas.microsoft.com/office/drawing/2010/main" w="9525">
+                <a14:hiddenLine xmlns:a14="http://schemas.microsoft.com/office/drawing/2010/main" xmlns="" w="9525">
                   <a:solidFill>
                     <a:srgbClr val="000000"/>
                   </a:solidFill>
@@ -3607,7 +3607,7 @@
             </a:ln>
             <a:extLst>
               <a:ext uri="{91240B29-F687-4f45-9708-019B960494DF}">
-                <a14:hiddenLine xmlns="" xmlns:a14="http://schemas.microsoft.com/office/drawing/2010/main" w="9525">
+                <a14:hiddenLine xmlns:a14="http://schemas.microsoft.com/office/drawing/2010/main" xmlns="" w="9525">
                   <a:solidFill>
                     <a:srgbClr val="000000"/>
                   </a:solidFill>
@@ -3672,7 +3672,7 @@
             </a:ln>
             <a:extLst>
               <a:ext uri="{91240B29-F687-4f45-9708-019B960494DF}">
-                <a14:hiddenLine xmlns="" xmlns:a14="http://schemas.microsoft.com/office/drawing/2010/main" w="9525">
+                <a14:hiddenLine xmlns:a14="http://schemas.microsoft.com/office/drawing/2010/main" xmlns="" w="9525">
                   <a:solidFill>
                     <a:srgbClr val="000000"/>
                   </a:solidFill>
@@ -3734,7 +3734,7 @@
             </a:ln>
             <a:extLst>
               <a:ext uri="{91240B29-F687-4f45-9708-019B960494DF}">
-                <a14:hiddenLine xmlns="" xmlns:a14="http://schemas.microsoft.com/office/drawing/2010/main" w="9525">
+                <a14:hiddenLine xmlns:a14="http://schemas.microsoft.com/office/drawing/2010/main" xmlns="" w="9525">
                   <a:solidFill>
                     <a:srgbClr val="000000"/>
                   </a:solidFill>
@@ -3824,7 +3824,7 @@
             </a:ln>
             <a:extLst>
               <a:ext uri="{91240B29-F687-4f45-9708-019B960494DF}">
-                <a14:hiddenLine xmlns="" xmlns:a14="http://schemas.microsoft.com/office/drawing/2010/main" w="9525">
+                <a14:hiddenLine xmlns:a14="http://schemas.microsoft.com/office/drawing/2010/main" xmlns="" w="9525">
                   <a:solidFill>
                     <a:srgbClr val="000000"/>
                   </a:solidFill>
@@ -3914,7 +3914,7 @@
             </a:ln>
             <a:extLst>
               <a:ext uri="{91240B29-F687-4f45-9708-019B960494DF}">
-                <a14:hiddenLine xmlns="" xmlns:a14="http://schemas.microsoft.com/office/drawing/2010/main" w="9525">
+                <a14:hiddenLine xmlns:a14="http://schemas.microsoft.com/office/drawing/2010/main" xmlns="" w="9525">
                   <a:solidFill>
                     <a:srgbClr val="000000"/>
                   </a:solidFill>
@@ -3976,7 +3976,7 @@
             </a:ln>
             <a:extLst>
               <a:ext uri="{91240B29-F687-4f45-9708-019B960494DF}">
-                <a14:hiddenLine xmlns="" xmlns:a14="http://schemas.microsoft.com/office/drawing/2010/main" w="9525">
+                <a14:hiddenLine xmlns:a14="http://schemas.microsoft.com/office/drawing/2010/main" xmlns="" w="9525">
                   <a:solidFill>
                     <a:srgbClr val="000000"/>
                   </a:solidFill>
@@ -4096,7 +4096,7 @@
             </a:ln>
             <a:extLst>
               <a:ext uri="{91240B29-F687-4f45-9708-019B960494DF}">
-                <a14:hiddenLine xmlns="" xmlns:a14="http://schemas.microsoft.com/office/drawing/2010/main" w="9525">
+                <a14:hiddenLine xmlns:a14="http://schemas.microsoft.com/office/drawing/2010/main" xmlns="" w="9525">
                   <a:solidFill>
                     <a:srgbClr val="000000"/>
                   </a:solidFill>
@@ -4164,7 +4164,7 @@
             </a:ln>
             <a:extLst>
               <a:ext uri="{91240B29-F687-4f45-9708-019B960494DF}">
-                <a14:hiddenLine xmlns="" xmlns:a14="http://schemas.microsoft.com/office/drawing/2010/main" w="9525">
+                <a14:hiddenLine xmlns:a14="http://schemas.microsoft.com/office/drawing/2010/main" xmlns="" w="9525">
                   <a:solidFill>
                     <a:srgbClr val="000000"/>
                   </a:solidFill>
@@ -4254,7 +4254,7 @@
             </a:ln>
             <a:extLst>
               <a:ext uri="{91240B29-F687-4f45-9708-019B960494DF}">
-                <a14:hiddenLine xmlns="" xmlns:a14="http://schemas.microsoft.com/office/drawing/2010/main" w="9525">
+                <a14:hiddenLine xmlns:a14="http://schemas.microsoft.com/office/drawing/2010/main" xmlns="" w="9525">
                   <a:solidFill>
                     <a:srgbClr val="000000"/>
                   </a:solidFill>
@@ -4394,7 +4394,7 @@
           <a:p>
             <a:fld id="{48A87A34-81AB-432B-8DAE-1953F412C126}" type="datetimeFigureOut">
               <a:rPr lang="en-US" dirty="0"/>
-              <a:t>6/2/2021</a:t>
+              <a:t>3/29/2023</a:t>
             </a:fld>
             <a:endParaRPr lang="en-US" dirty="0"/>
           </a:p>
@@ -4656,7 +4656,7 @@
           <a:p>
             <a:fld id="{48A87A34-81AB-432B-8DAE-1953F412C126}" type="datetimeFigureOut">
               <a:rPr lang="en-US" dirty="0"/>
-              <a:t>6/2/2021</a:t>
+              <a:t>3/29/2023</a:t>
             </a:fld>
             <a:endParaRPr lang="en-US" dirty="0"/>
           </a:p>
@@ -4847,7 +4847,7 @@
           <a:p>
             <a:fld id="{48A87A34-81AB-432B-8DAE-1953F412C126}" type="datetimeFigureOut">
               <a:rPr lang="en-US" dirty="0"/>
-              <a:t>6/2/2021</a:t>
+              <a:t>3/29/2023</a:t>
             </a:fld>
             <a:endParaRPr lang="en-US" dirty="0"/>
           </a:p>
@@ -5105,7 +5105,7 @@
           <a:p>
             <a:fld id="{48A87A34-81AB-432B-8DAE-1953F412C126}" type="datetimeFigureOut">
               <a:rPr lang="en-US" dirty="0"/>
-              <a:t>6/2/2021</a:t>
+              <a:t>3/29/2023</a:t>
             </a:fld>
             <a:endParaRPr lang="en-US" dirty="0"/>
           </a:p>
@@ -5534,7 +5534,7 @@
           <a:p>
             <a:fld id="{48A87A34-81AB-432B-8DAE-1953F412C126}" type="datetimeFigureOut">
               <a:rPr lang="en-US" dirty="0"/>
-              <a:t>6/2/2021</a:t>
+              <a:t>3/29/2023</a:t>
             </a:fld>
             <a:endParaRPr lang="en-US" dirty="0"/>
           </a:p>
@@ -6075,7 +6075,7 @@
           <a:p>
             <a:fld id="{48A87A34-81AB-432B-8DAE-1953F412C126}" type="datetimeFigureOut">
               <a:rPr lang="en-US" dirty="0"/>
-              <a:t>6/2/2021</a:t>
+              <a:t>3/29/2023</a:t>
             </a:fld>
             <a:endParaRPr lang="en-US" dirty="0"/>
           </a:p>
@@ -6790,7 +6790,7 @@
           <a:p>
             <a:fld id="{48A87A34-81AB-432B-8DAE-1953F412C126}" type="datetimeFigureOut">
               <a:rPr lang="en-US" dirty="0"/>
-              <a:t>6/2/2021</a:t>
+              <a:t>3/29/2023</a:t>
             </a:fld>
             <a:endParaRPr lang="en-US" dirty="0"/>
           </a:p>
@@ -6955,7 +6955,7 @@
           <a:p>
             <a:fld id="{48A87A34-81AB-432B-8DAE-1953F412C126}" type="datetimeFigureOut">
               <a:rPr lang="en-US" dirty="0"/>
-              <a:t>6/2/2021</a:t>
+              <a:t>3/29/2023</a:t>
             </a:fld>
             <a:endParaRPr lang="en-US" dirty="0"/>
           </a:p>
@@ -7130,7 +7130,7 @@
           <a:p>
             <a:fld id="{48A87A34-81AB-432B-8DAE-1953F412C126}" type="datetimeFigureOut">
               <a:rPr lang="en-US" dirty="0"/>
-              <a:t>6/2/2021</a:t>
+              <a:t>3/29/2023</a:t>
             </a:fld>
             <a:endParaRPr lang="en-US" dirty="0"/>
           </a:p>
@@ -7295,7 +7295,7 @@
           <a:p>
             <a:fld id="{48A87A34-81AB-432B-8DAE-1953F412C126}" type="datetimeFigureOut">
               <a:rPr lang="en-US" dirty="0"/>
-              <a:t>6/2/2021</a:t>
+              <a:t>3/29/2023</a:t>
             </a:fld>
             <a:endParaRPr lang="en-US" dirty="0"/>
           </a:p>
@@ -7540,7 +7540,7 @@
           <a:p>
             <a:fld id="{48A87A34-81AB-432B-8DAE-1953F412C126}" type="datetimeFigureOut">
               <a:rPr lang="en-US" dirty="0"/>
-              <a:t>6/2/2021</a:t>
+              <a:t>3/29/2023</a:t>
             </a:fld>
             <a:endParaRPr lang="en-US" dirty="0"/>
           </a:p>
@@ -7767,7 +7767,7 @@
           <a:p>
             <a:fld id="{48A87A34-81AB-432B-8DAE-1953F412C126}" type="datetimeFigureOut">
               <a:rPr lang="en-US" dirty="0"/>
-              <a:t>6/2/2021</a:t>
+              <a:t>3/29/2023</a:t>
             </a:fld>
             <a:endParaRPr lang="en-US" dirty="0"/>
           </a:p>
@@ -8143,7 +8143,7 @@
           <a:p>
             <a:fld id="{48A87A34-81AB-432B-8DAE-1953F412C126}" type="datetimeFigureOut">
               <a:rPr lang="en-US" dirty="0"/>
-              <a:t>6/2/2021</a:t>
+              <a:t>3/29/2023</a:t>
             </a:fld>
             <a:endParaRPr lang="en-US" dirty="0"/>
           </a:p>
@@ -8256,7 +8256,7 @@
           <a:p>
             <a:fld id="{48A87A34-81AB-432B-8DAE-1953F412C126}" type="datetimeFigureOut">
               <a:rPr lang="en-US" dirty="0"/>
-              <a:t>6/2/2021</a:t>
+              <a:t>3/29/2023</a:t>
             </a:fld>
             <a:endParaRPr lang="en-US" dirty="0"/>
           </a:p>
@@ -8346,7 +8346,7 @@
           <a:p>
             <a:fld id="{48A87A34-81AB-432B-8DAE-1953F412C126}" type="datetimeFigureOut">
               <a:rPr lang="en-US" dirty="0"/>
-              <a:t>6/2/2021</a:t>
+              <a:t>3/29/2023</a:t>
             </a:fld>
             <a:endParaRPr lang="en-US" dirty="0"/>
           </a:p>
@@ -8590,7 +8590,7 @@
           <a:p>
             <a:fld id="{48A87A34-81AB-432B-8DAE-1953F412C126}" type="datetimeFigureOut">
               <a:rPr lang="en-US" dirty="0"/>
-              <a:t>6/2/2021</a:t>
+              <a:t>3/29/2023</a:t>
             </a:fld>
             <a:endParaRPr lang="en-US" dirty="0"/>
           </a:p>
@@ -8865,7 +8865,7 @@
           <a:p>
             <a:fld id="{48A87A34-81AB-432B-8DAE-1953F412C126}" type="datetimeFigureOut">
               <a:rPr lang="en-US" dirty="0"/>
-              <a:t>6/2/2021</a:t>
+              <a:t>3/29/2023</a:t>
             </a:fld>
             <a:endParaRPr lang="en-US" dirty="0"/>
           </a:p>
@@ -8976,7 +8976,7 @@
           <a:noFill/>
           <a:extLst>
             <a:ext uri="{909E8E84-426E-40dd-AFC4-6F175D3DCCD1}">
-              <a14:hiddenFill xmlns="" xmlns:a14="http://schemas.microsoft.com/office/drawing/2010/main">
+              <a14:hiddenFill xmlns:a14="http://schemas.microsoft.com/office/drawing/2010/main" xmlns="">
                 <a:solidFill>
                   <a:srgbClr val="FFFFFF"/>
                 </a:solidFill>
@@ -9050,7 +9050,7 @@
               </a:ln>
               <a:extLst>
                 <a:ext uri="{91240B29-F687-4f45-9708-019B960494DF}">
-                  <a14:hiddenLine xmlns="" xmlns:a14="http://schemas.microsoft.com/office/drawing/2010/main" w="9525">
+                  <a14:hiddenLine xmlns:a14="http://schemas.microsoft.com/office/drawing/2010/main" xmlns="" w="9525">
                     <a:solidFill>
                       <a:srgbClr val="000000"/>
                     </a:solidFill>
@@ -9140,7 +9140,7 @@
               </a:ln>
               <a:extLst>
                 <a:ext uri="{91240B29-F687-4f45-9708-019B960494DF}">
-                  <a14:hiddenLine xmlns="" xmlns:a14="http://schemas.microsoft.com/office/drawing/2010/main" w="9525">
+                  <a14:hiddenLine xmlns:a14="http://schemas.microsoft.com/office/drawing/2010/main" xmlns="" w="9525">
                     <a:solidFill>
                       <a:srgbClr val="000000"/>
                     </a:solidFill>
@@ -9230,7 +9230,7 @@
               </a:ln>
               <a:extLst>
                 <a:ext uri="{91240B29-F687-4f45-9708-019B960494DF}">
-                  <a14:hiddenLine xmlns="" xmlns:a14="http://schemas.microsoft.com/office/drawing/2010/main" w="9525">
+                  <a14:hiddenLine xmlns:a14="http://schemas.microsoft.com/office/drawing/2010/main" xmlns="" w="9525">
                     <a:solidFill>
                       <a:srgbClr val="000000"/>
                     </a:solidFill>
@@ -9292,7 +9292,7 @@
               </a:ln>
               <a:extLst>
                 <a:ext uri="{91240B29-F687-4f45-9708-019B960494DF}">
-                  <a14:hiddenLine xmlns="" xmlns:a14="http://schemas.microsoft.com/office/drawing/2010/main" w="9525">
+                  <a14:hiddenLine xmlns:a14="http://schemas.microsoft.com/office/drawing/2010/main" xmlns="" w="9525">
                     <a:solidFill>
                       <a:srgbClr val="000000"/>
                     </a:solidFill>
@@ -9382,7 +9382,7 @@
               </a:ln>
               <a:extLst>
                 <a:ext uri="{91240B29-F687-4f45-9708-019B960494DF}">
-                  <a14:hiddenLine xmlns="" xmlns:a14="http://schemas.microsoft.com/office/drawing/2010/main" w="9525">
+                  <a14:hiddenLine xmlns:a14="http://schemas.microsoft.com/office/drawing/2010/main" xmlns="" w="9525">
                     <a:solidFill>
                       <a:srgbClr val="000000"/>
                     </a:solidFill>
@@ -9444,7 +9444,7 @@
               </a:ln>
               <a:extLst>
                 <a:ext uri="{91240B29-F687-4f45-9708-019B960494DF}">
-                  <a14:hiddenLine xmlns="" xmlns:a14="http://schemas.microsoft.com/office/drawing/2010/main" w="9525">
+                  <a14:hiddenLine xmlns:a14="http://schemas.microsoft.com/office/drawing/2010/main" xmlns="" w="9525">
                     <a:solidFill>
                       <a:srgbClr val="000000"/>
                     </a:solidFill>
@@ -9506,7 +9506,7 @@
               </a:ln>
               <a:extLst>
                 <a:ext uri="{91240B29-F687-4f45-9708-019B960494DF}">
-                  <a14:hiddenLine xmlns="" xmlns:a14="http://schemas.microsoft.com/office/drawing/2010/main" w="9525">
+                  <a14:hiddenLine xmlns:a14="http://schemas.microsoft.com/office/drawing/2010/main" xmlns="" w="9525">
                     <a:solidFill>
                       <a:srgbClr val="000000"/>
                     </a:solidFill>
@@ -9596,7 +9596,7 @@
               </a:ln>
               <a:extLst>
                 <a:ext uri="{91240B29-F687-4f45-9708-019B960494DF}">
-                  <a14:hiddenLine xmlns="" xmlns:a14="http://schemas.microsoft.com/office/drawing/2010/main" w="9525">
+                  <a14:hiddenLine xmlns:a14="http://schemas.microsoft.com/office/drawing/2010/main" xmlns="" w="9525">
                     <a:solidFill>
                       <a:srgbClr val="000000"/>
                     </a:solidFill>
@@ -9686,7 +9686,7 @@
               </a:ln>
               <a:extLst>
                 <a:ext uri="{91240B29-F687-4f45-9708-019B960494DF}">
-                  <a14:hiddenLine xmlns="" xmlns:a14="http://schemas.microsoft.com/office/drawing/2010/main" w="9525">
+                  <a14:hiddenLine xmlns:a14="http://schemas.microsoft.com/office/drawing/2010/main" xmlns="" w="9525">
                     <a:solidFill>
                       <a:srgbClr val="000000"/>
                     </a:solidFill>
@@ -9748,7 +9748,7 @@
               </a:ln>
               <a:extLst>
                 <a:ext uri="{91240B29-F687-4f45-9708-019B960494DF}">
-                  <a14:hiddenLine xmlns="" xmlns:a14="http://schemas.microsoft.com/office/drawing/2010/main" w="9525">
+                  <a14:hiddenLine xmlns:a14="http://schemas.microsoft.com/office/drawing/2010/main" xmlns="" w="9525">
                     <a:solidFill>
                       <a:srgbClr val="000000"/>
                     </a:solidFill>
@@ -9858,7 +9858,7 @@
               </a:ln>
               <a:extLst>
                 <a:ext uri="{91240B29-F687-4f45-9708-019B960494DF}">
-                  <a14:hiddenLine xmlns="" xmlns:a14="http://schemas.microsoft.com/office/drawing/2010/main" w="9525">
+                  <a14:hiddenLine xmlns:a14="http://schemas.microsoft.com/office/drawing/2010/main" xmlns="" w="9525">
                     <a:solidFill>
                       <a:srgbClr val="000000"/>
                     </a:solidFill>
@@ -9942,7 +9942,7 @@
               </a:ln>
               <a:extLst>
                 <a:ext uri="{91240B29-F687-4f45-9708-019B960494DF}">
-                  <a14:hiddenLine xmlns="" xmlns:a14="http://schemas.microsoft.com/office/drawing/2010/main" w="9525">
+                  <a14:hiddenLine xmlns:a14="http://schemas.microsoft.com/office/drawing/2010/main" xmlns="" w="9525">
                     <a:solidFill>
                       <a:srgbClr val="000000"/>
                     </a:solidFill>
@@ -10004,7 +10004,7 @@
               </a:ln>
               <a:extLst>
                 <a:ext uri="{91240B29-F687-4f45-9708-019B960494DF}">
-                  <a14:hiddenLine xmlns="" xmlns:a14="http://schemas.microsoft.com/office/drawing/2010/main" w="9525">
+                  <a14:hiddenLine xmlns:a14="http://schemas.microsoft.com/office/drawing/2010/main" xmlns="" w="9525">
                     <a:solidFill>
                       <a:srgbClr val="000000"/>
                     </a:solidFill>
@@ -10066,7 +10066,7 @@
               </a:ln>
               <a:extLst>
                 <a:ext uri="{91240B29-F687-4f45-9708-019B960494DF}">
-                  <a14:hiddenLine xmlns="" xmlns:a14="http://schemas.microsoft.com/office/drawing/2010/main" w="9525">
+                  <a14:hiddenLine xmlns:a14="http://schemas.microsoft.com/office/drawing/2010/main" xmlns="" w="9525">
                     <a:solidFill>
                       <a:srgbClr val="000000"/>
                     </a:solidFill>
@@ -10156,7 +10156,7 @@
               </a:ln>
               <a:extLst>
                 <a:ext uri="{91240B29-F687-4f45-9708-019B960494DF}">
-                  <a14:hiddenLine xmlns="" xmlns:a14="http://schemas.microsoft.com/office/drawing/2010/main" w="9525">
+                  <a14:hiddenLine xmlns:a14="http://schemas.microsoft.com/office/drawing/2010/main" xmlns="" w="9525">
                     <a:solidFill>
                       <a:srgbClr val="000000"/>
                     </a:solidFill>
@@ -10190,7 +10190,7 @@
               </a:ln>
               <a:extLst>
                 <a:ext uri="{91240B29-F687-4f45-9708-019B960494DF}">
-                  <a14:hiddenLine xmlns="" xmlns:a14="http://schemas.microsoft.com/office/drawing/2010/main" w="9525">
+                  <a14:hiddenLine xmlns:a14="http://schemas.microsoft.com/office/drawing/2010/main" xmlns="" w="9525">
                     <a:solidFill>
                       <a:srgbClr val="000000"/>
                     </a:solidFill>
@@ -10255,7 +10255,7 @@
               </a:ln>
               <a:extLst>
                 <a:ext uri="{91240B29-F687-4f45-9708-019B960494DF}">
-                  <a14:hiddenLine xmlns="" xmlns:a14="http://schemas.microsoft.com/office/drawing/2010/main" w="9525">
+                  <a14:hiddenLine xmlns:a14="http://schemas.microsoft.com/office/drawing/2010/main" xmlns="" w="9525">
                     <a:solidFill>
                       <a:srgbClr val="000000"/>
                     </a:solidFill>
@@ -10345,7 +10345,7 @@
               </a:ln>
               <a:extLst>
                 <a:ext uri="{91240B29-F687-4f45-9708-019B960494DF}">
-                  <a14:hiddenLine xmlns="" xmlns:a14="http://schemas.microsoft.com/office/drawing/2010/main" w="9525">
+                  <a14:hiddenLine xmlns:a14="http://schemas.microsoft.com/office/drawing/2010/main" xmlns="" w="9525">
                     <a:solidFill>
                       <a:srgbClr val="000000"/>
                     </a:solidFill>
@@ -10407,7 +10407,7 @@
               </a:ln>
               <a:extLst>
                 <a:ext uri="{91240B29-F687-4f45-9708-019B960494DF}">
-                  <a14:hiddenLine xmlns="" xmlns:a14="http://schemas.microsoft.com/office/drawing/2010/main" w="9525">
+                  <a14:hiddenLine xmlns:a14="http://schemas.microsoft.com/office/drawing/2010/main" xmlns="" w="9525">
                     <a:solidFill>
                       <a:srgbClr val="000000"/>
                     </a:solidFill>
@@ -10497,7 +10497,7 @@
               </a:ln>
               <a:extLst>
                 <a:ext uri="{91240B29-F687-4f45-9708-019B960494DF}">
-                  <a14:hiddenLine xmlns="" xmlns:a14="http://schemas.microsoft.com/office/drawing/2010/main" w="9525">
+                  <a14:hiddenLine xmlns:a14="http://schemas.microsoft.com/office/drawing/2010/main" xmlns="" w="9525">
                     <a:solidFill>
                       <a:srgbClr val="000000"/>
                     </a:solidFill>
@@ -10562,7 +10562,7 @@
               </a:ln>
               <a:extLst>
                 <a:ext uri="{91240B29-F687-4f45-9708-019B960494DF}">
-                  <a14:hiddenLine xmlns="" xmlns:a14="http://schemas.microsoft.com/office/drawing/2010/main" w="9525">
+                  <a14:hiddenLine xmlns:a14="http://schemas.microsoft.com/office/drawing/2010/main" xmlns="" w="9525">
                     <a:solidFill>
                       <a:srgbClr val="000000"/>
                     </a:solidFill>
@@ -10624,7 +10624,7 @@
               </a:ln>
               <a:extLst>
                 <a:ext uri="{91240B29-F687-4f45-9708-019B960494DF}">
-                  <a14:hiddenLine xmlns="" xmlns:a14="http://schemas.microsoft.com/office/drawing/2010/main" w="9525">
+                  <a14:hiddenLine xmlns:a14="http://schemas.microsoft.com/office/drawing/2010/main" xmlns="" w="9525">
                     <a:solidFill>
                       <a:srgbClr val="000000"/>
                     </a:solidFill>
@@ -10714,7 +10714,7 @@
               </a:ln>
               <a:extLst>
                 <a:ext uri="{91240B29-F687-4f45-9708-019B960494DF}">
-                  <a14:hiddenLine xmlns="" xmlns:a14="http://schemas.microsoft.com/office/drawing/2010/main" w="9525">
+                  <a14:hiddenLine xmlns:a14="http://schemas.microsoft.com/office/drawing/2010/main" xmlns="" w="9525">
                     <a:solidFill>
                       <a:srgbClr val="000000"/>
                     </a:solidFill>
@@ -10804,7 +10804,7 @@
               </a:ln>
               <a:extLst>
                 <a:ext uri="{91240B29-F687-4f45-9708-019B960494DF}">
-                  <a14:hiddenLine xmlns="" xmlns:a14="http://schemas.microsoft.com/office/drawing/2010/main" w="9525">
+                  <a14:hiddenLine xmlns:a14="http://schemas.microsoft.com/office/drawing/2010/main" xmlns="" w="9525">
                     <a:solidFill>
                       <a:srgbClr val="000000"/>
                     </a:solidFill>
@@ -10869,7 +10869,7 @@
               </a:ln>
               <a:extLst>
                 <a:ext uri="{91240B29-F687-4f45-9708-019B960494DF}">
-                  <a14:hiddenLine xmlns="" xmlns:a14="http://schemas.microsoft.com/office/drawing/2010/main" w="9525">
+                  <a14:hiddenLine xmlns:a14="http://schemas.microsoft.com/office/drawing/2010/main" xmlns="" w="9525">
                     <a:solidFill>
                       <a:srgbClr val="000000"/>
                     </a:solidFill>
@@ -10989,7 +10989,7 @@
               </a:ln>
               <a:extLst>
                 <a:ext uri="{91240B29-F687-4f45-9708-019B960494DF}">
-                  <a14:hiddenLine xmlns="" xmlns:a14="http://schemas.microsoft.com/office/drawing/2010/main" w="9525">
+                  <a14:hiddenLine xmlns:a14="http://schemas.microsoft.com/office/drawing/2010/main" xmlns="" w="9525">
                     <a:solidFill>
                       <a:srgbClr val="000000"/>
                     </a:solidFill>
@@ -11087,7 +11087,7 @@
               </a:ln>
               <a:extLst>
                 <a:ext uri="{91240B29-F687-4f45-9708-019B960494DF}">
-                  <a14:hiddenLine xmlns="" xmlns:a14="http://schemas.microsoft.com/office/drawing/2010/main" w="9525">
+                  <a14:hiddenLine xmlns:a14="http://schemas.microsoft.com/office/drawing/2010/main" xmlns="" w="9525">
                     <a:solidFill>
                       <a:srgbClr val="000000"/>
                     </a:solidFill>
@@ -11202,7 +11202,7 @@
               </a:ln>
               <a:extLst>
                 <a:ext uri="{91240B29-F687-4f45-9708-019B960494DF}">
-                  <a14:hiddenLine xmlns="" xmlns:a14="http://schemas.microsoft.com/office/drawing/2010/main" w="9525">
+                  <a14:hiddenLine xmlns:a14="http://schemas.microsoft.com/office/drawing/2010/main" xmlns="" w="9525">
                     <a:solidFill>
                       <a:srgbClr val="000000"/>
                     </a:solidFill>
@@ -11292,7 +11292,7 @@
               </a:ln>
               <a:extLst>
                 <a:ext uri="{91240B29-F687-4f45-9708-019B960494DF}">
-                  <a14:hiddenLine xmlns="" xmlns:a14="http://schemas.microsoft.com/office/drawing/2010/main" w="9525">
+                  <a14:hiddenLine xmlns:a14="http://schemas.microsoft.com/office/drawing/2010/main" xmlns="" w="9525">
                     <a:solidFill>
                       <a:srgbClr val="000000"/>
                     </a:solidFill>
@@ -11357,7 +11357,7 @@
               </a:ln>
               <a:extLst>
                 <a:ext uri="{91240B29-F687-4f45-9708-019B960494DF}">
-                  <a14:hiddenLine xmlns="" xmlns:a14="http://schemas.microsoft.com/office/drawing/2010/main" w="9525">
+                  <a14:hiddenLine xmlns:a14="http://schemas.microsoft.com/office/drawing/2010/main" xmlns="" w="9525">
                     <a:solidFill>
                       <a:srgbClr val="000000"/>
                     </a:solidFill>
@@ -11447,7 +11447,7 @@
               </a:ln>
               <a:extLst>
                 <a:ext uri="{91240B29-F687-4f45-9708-019B960494DF}">
-                  <a14:hiddenLine xmlns="" xmlns:a14="http://schemas.microsoft.com/office/drawing/2010/main" w="9525">
+                  <a14:hiddenLine xmlns:a14="http://schemas.microsoft.com/office/drawing/2010/main" xmlns="" w="9525">
                     <a:solidFill>
                       <a:srgbClr val="000000"/>
                     </a:solidFill>
@@ -11515,7 +11515,7 @@
               </a:ln>
               <a:extLst>
                 <a:ext uri="{91240B29-F687-4f45-9708-019B960494DF}">
-                  <a14:hiddenLine xmlns="" xmlns:a14="http://schemas.microsoft.com/office/drawing/2010/main" w="9525">
+                  <a14:hiddenLine xmlns:a14="http://schemas.microsoft.com/office/drawing/2010/main" xmlns="" w="9525">
                     <a:solidFill>
                       <a:srgbClr val="000000"/>
                     </a:solidFill>
@@ -11605,7 +11605,7 @@
               </a:ln>
               <a:extLst>
                 <a:ext uri="{91240B29-F687-4f45-9708-019B960494DF}">
-                  <a14:hiddenLine xmlns="" xmlns:a14="http://schemas.microsoft.com/office/drawing/2010/main" w="9525">
+                  <a14:hiddenLine xmlns:a14="http://schemas.microsoft.com/office/drawing/2010/main" xmlns="" w="9525">
                     <a:solidFill>
                       <a:srgbClr val="000000"/>
                     </a:solidFill>
@@ -11673,7 +11673,7 @@
               </a:ln>
               <a:extLst>
                 <a:ext uri="{91240B29-F687-4f45-9708-019B960494DF}">
-                  <a14:hiddenLine xmlns="" xmlns:a14="http://schemas.microsoft.com/office/drawing/2010/main" w="9525">
+                  <a14:hiddenLine xmlns:a14="http://schemas.microsoft.com/office/drawing/2010/main" xmlns="" w="9525">
                     <a:solidFill>
                       <a:srgbClr val="000000"/>
                     </a:solidFill>
@@ -11763,7 +11763,7 @@
               </a:ln>
               <a:extLst>
                 <a:ext uri="{91240B29-F687-4f45-9708-019B960494DF}">
-                  <a14:hiddenLine xmlns="" xmlns:a14="http://schemas.microsoft.com/office/drawing/2010/main" w="9525">
+                  <a14:hiddenLine xmlns:a14="http://schemas.microsoft.com/office/drawing/2010/main" xmlns="" w="9525">
                     <a:solidFill>
                       <a:srgbClr val="000000"/>
                     </a:solidFill>
@@ -11797,7 +11797,7 @@
               </a:ln>
               <a:extLst>
                 <a:ext uri="{91240B29-F687-4f45-9708-019B960494DF}">
-                  <a14:hiddenLine xmlns="" xmlns:a14="http://schemas.microsoft.com/office/drawing/2010/main" w="9525">
+                  <a14:hiddenLine xmlns:a14="http://schemas.microsoft.com/office/drawing/2010/main" xmlns="" w="9525">
                     <a:solidFill>
                       <a:srgbClr val="000000"/>
                     </a:solidFill>
@@ -11938,7 +11938,7 @@
             <a:fld id="{48A87A34-81AB-432B-8DAE-1953F412C126}" type="datetimeFigureOut">
               <a:rPr lang="en-US" dirty="0"/>
               <a:pPr/>
-              <a:t>6/2/2021</a:t>
+              <a:t>3/29/2023</a:t>
             </a:fld>
             <a:endParaRPr lang="en-US" dirty="0"/>
           </a:p>
@@ -12421,7 +12421,7 @@
           <a:p>
             <a:r>
               <a:rPr lang="en-US" dirty="0"/>
-              <a:t> Leverage existing .NET echo system</a:t>
+              <a:t> Leverage existing .NET eco system</a:t>
             </a:r>
           </a:p>
           <a:p>

</xml_diff>